<commit_message>
fixed mistakes in TD vocabulary UML diagram
</commit_message>
<xml_diff>
--- a/images/uml-overview.pptx
+++ b/images/uml-overview.pptx
@@ -257,7 +257,7 @@
           <a:p>
             <a:fld id="{65CEBD62-2936-4F77-8E23-0F21680CD184}" type="datetimeFigureOut">
               <a:rPr lang="fr-FR" smtClean="0"/>
-              <a:t>14/05/2019</a:t>
+              <a:t>15/05/2019</a:t>
             </a:fld>
             <a:endParaRPr lang="fr-FR"/>
           </a:p>
@@ -427,7 +427,7 @@
           <a:p>
             <a:fld id="{65CEBD62-2936-4F77-8E23-0F21680CD184}" type="datetimeFigureOut">
               <a:rPr lang="fr-FR" smtClean="0"/>
-              <a:t>14/05/2019</a:t>
+              <a:t>15/05/2019</a:t>
             </a:fld>
             <a:endParaRPr lang="fr-FR"/>
           </a:p>
@@ -607,7 +607,7 @@
           <a:p>
             <a:fld id="{65CEBD62-2936-4F77-8E23-0F21680CD184}" type="datetimeFigureOut">
               <a:rPr lang="fr-FR" smtClean="0"/>
-              <a:t>14/05/2019</a:t>
+              <a:t>15/05/2019</a:t>
             </a:fld>
             <a:endParaRPr lang="fr-FR"/>
           </a:p>
@@ -777,7 +777,7 @@
           <a:p>
             <a:fld id="{65CEBD62-2936-4F77-8E23-0F21680CD184}" type="datetimeFigureOut">
               <a:rPr lang="fr-FR" smtClean="0"/>
-              <a:t>14/05/2019</a:t>
+              <a:t>15/05/2019</a:t>
             </a:fld>
             <a:endParaRPr lang="fr-FR"/>
           </a:p>
@@ -1021,7 +1021,7 @@
           <a:p>
             <a:fld id="{65CEBD62-2936-4F77-8E23-0F21680CD184}" type="datetimeFigureOut">
               <a:rPr lang="fr-FR" smtClean="0"/>
-              <a:t>14/05/2019</a:t>
+              <a:t>15/05/2019</a:t>
             </a:fld>
             <a:endParaRPr lang="fr-FR"/>
           </a:p>
@@ -1253,7 +1253,7 @@
           <a:p>
             <a:fld id="{65CEBD62-2936-4F77-8E23-0F21680CD184}" type="datetimeFigureOut">
               <a:rPr lang="fr-FR" smtClean="0"/>
-              <a:t>14/05/2019</a:t>
+              <a:t>15/05/2019</a:t>
             </a:fld>
             <a:endParaRPr lang="fr-FR"/>
           </a:p>
@@ -1620,7 +1620,7 @@
           <a:p>
             <a:fld id="{65CEBD62-2936-4F77-8E23-0F21680CD184}" type="datetimeFigureOut">
               <a:rPr lang="fr-FR" smtClean="0"/>
-              <a:t>14/05/2019</a:t>
+              <a:t>15/05/2019</a:t>
             </a:fld>
             <a:endParaRPr lang="fr-FR"/>
           </a:p>
@@ -1738,7 +1738,7 @@
           <a:p>
             <a:fld id="{65CEBD62-2936-4F77-8E23-0F21680CD184}" type="datetimeFigureOut">
               <a:rPr lang="fr-FR" smtClean="0"/>
-              <a:t>14/05/2019</a:t>
+              <a:t>15/05/2019</a:t>
             </a:fld>
             <a:endParaRPr lang="fr-FR"/>
           </a:p>
@@ -1833,7 +1833,7 @@
           <a:p>
             <a:fld id="{65CEBD62-2936-4F77-8E23-0F21680CD184}" type="datetimeFigureOut">
               <a:rPr lang="fr-FR" smtClean="0"/>
-              <a:t>14/05/2019</a:t>
+              <a:t>15/05/2019</a:t>
             </a:fld>
             <a:endParaRPr lang="fr-FR"/>
           </a:p>
@@ -2110,7 +2110,7 @@
           <a:p>
             <a:fld id="{65CEBD62-2936-4F77-8E23-0F21680CD184}" type="datetimeFigureOut">
               <a:rPr lang="fr-FR" smtClean="0"/>
-              <a:t>14/05/2019</a:t>
+              <a:t>15/05/2019</a:t>
             </a:fld>
             <a:endParaRPr lang="fr-FR"/>
           </a:p>
@@ -2367,7 +2367,7 @@
           <a:p>
             <a:fld id="{65CEBD62-2936-4F77-8E23-0F21680CD184}" type="datetimeFigureOut">
               <a:rPr lang="fr-FR" smtClean="0"/>
-              <a:t>14/05/2019</a:t>
+              <a:t>15/05/2019</a:t>
             </a:fld>
             <a:endParaRPr lang="fr-FR"/>
           </a:p>
@@ -2580,7 +2580,7 @@
           <a:p>
             <a:fld id="{65CEBD62-2936-4F77-8E23-0F21680CD184}" type="datetimeFigureOut">
               <a:rPr lang="fr-FR" smtClean="0"/>
-              <a:t>14/05/2019</a:t>
+              <a:t>15/05/2019</a:t>
             </a:fld>
             <a:endParaRPr lang="fr-FR"/>
           </a:p>
@@ -3828,7 +3828,7 @@
           <p:nvPr>
             <p:extLst>
               <p:ext uri="{D42A27DB-BD31-4B8C-83A1-F6EECF244321}">
-                <p14:modId xmlns:p14="http://schemas.microsoft.com/office/powerpoint/2010/main" val="1332999311"/>
+                <p14:modId xmlns:p14="http://schemas.microsoft.com/office/powerpoint/2010/main" val="1197667112"/>
               </p:ext>
             </p:extLst>
           </p:nvPr>
@@ -3982,6 +3982,26 @@
                           <a:cs typeface="Courier New" panose="02070309020205020404" pitchFamily="49" charset="0"/>
                         </a:rPr>
                         <a:t>string</a:t>
+                      </a:r>
+                      <a:r>
+                        <a:rPr lang="de-DE" sz="1200" dirty="0">
+                          <a:solidFill>
+                            <a:srgbClr val="C83500"/>
+                          </a:solidFill>
+                          <a:latin typeface="Courier New" panose="02070309020205020404" pitchFamily="49" charset="0"/>
+                          <a:cs typeface="Courier New" panose="02070309020205020404" pitchFamily="49" charset="0"/>
+                        </a:rPr>
+                        <a:t> </a:t>
+                      </a:r>
+                      <a:r>
+                        <a:rPr lang="de-DE" sz="1200" dirty="0">
+                          <a:solidFill>
+                            <a:schemeClr val="tx1"/>
+                          </a:solidFill>
+                          <a:latin typeface="Courier New" panose="02070309020205020404" pitchFamily="49" charset="0"/>
+                          <a:cs typeface="Courier New" panose="02070309020205020404" pitchFamily="49" charset="0"/>
+                        </a:rPr>
+                        <a:t>[0..1]</a:t>
                       </a:r>
                       <a:endParaRPr lang="fr-FR" sz="1200" dirty="0">
                         <a:solidFill>
@@ -6239,10 +6259,10 @@
         </p:nvGrpSpPr>
         <p:grpSpPr>
           <a:xfrm>
-            <a:off x="6860321" y="1933317"/>
-            <a:ext cx="2132823" cy="1741045"/>
-            <a:chOff x="6860321" y="1933317"/>
-            <a:chExt cx="2132823" cy="1741045"/>
+            <a:off x="6867191" y="2195107"/>
+            <a:ext cx="2125953" cy="1479255"/>
+            <a:chOff x="6867191" y="2195107"/>
+            <a:chExt cx="2125953" cy="1479255"/>
           </a:xfrm>
         </p:grpSpPr>
         <p:grpSp>
@@ -6259,10 +6279,10 @@
           </p:nvGrpSpPr>
           <p:grpSpPr>
             <a:xfrm>
-              <a:off x="6867193" y="2095244"/>
-              <a:ext cx="2125951" cy="1579118"/>
-              <a:chOff x="6867193" y="2095244"/>
-              <a:chExt cx="2125951" cy="1579118"/>
+              <a:off x="6867193" y="2196591"/>
+              <a:ext cx="2125951" cy="1477771"/>
+              <a:chOff x="6867193" y="2196591"/>
+              <a:chExt cx="2125951" cy="1477771"/>
             </a:xfrm>
           </p:grpSpPr>
           <p:cxnSp>
@@ -6326,8 +6346,8 @@
             </p:nvSpPr>
             <p:spPr>
               <a:xfrm>
-                <a:off x="7513155" y="2095244"/>
-                <a:ext cx="649537" cy="276999"/>
+                <a:off x="7187745" y="2662180"/>
+                <a:ext cx="1300356" cy="461665"/>
               </a:xfrm>
               <a:prstGeom prst="rect">
                 <a:avLst/>
@@ -6339,15 +6359,36 @@
               </a:bodyPr>
               <a:lstStyle/>
               <a:p>
+                <a:pPr algn="r"/>
                 <a:r>
-                  <a:rPr lang="de-DE" sz="1200" dirty="0">
+                  <a:rPr lang="de-DE" sz="1200" dirty="0" err="1">
                     <a:solidFill>
                       <a:srgbClr val="C83500"/>
                     </a:solidFill>
                     <a:latin typeface="Courier New" panose="02070309020205020404" pitchFamily="49" charset="0"/>
                     <a:cs typeface="Courier New" panose="02070309020205020404" pitchFamily="49" charset="0"/>
                   </a:rPr>
-                  <a:t>links</a:t>
+                  <a:t>titles</a:t>
+                </a:r>
+                <a:endParaRPr lang="de-DE" sz="1200" dirty="0">
+                  <a:solidFill>
+                    <a:srgbClr val="C83500"/>
+                  </a:solidFill>
+                  <a:latin typeface="Courier New" panose="02070309020205020404" pitchFamily="49" charset="0"/>
+                  <a:cs typeface="Courier New" panose="02070309020205020404" pitchFamily="49" charset="0"/>
+                </a:endParaRPr>
+              </a:p>
+              <a:p>
+                <a:pPr algn="r"/>
+                <a:r>
+                  <a:rPr lang="de-DE" sz="1200" dirty="0" err="1">
+                    <a:solidFill>
+                      <a:srgbClr val="C83500"/>
+                    </a:solidFill>
+                    <a:latin typeface="Courier New" panose="02070309020205020404" pitchFamily="49" charset="0"/>
+                    <a:cs typeface="Courier New" panose="02070309020205020404" pitchFamily="49" charset="0"/>
+                  </a:rPr>
+                  <a:t>descriptions</a:t>
                 </a:r>
                 <a:endParaRPr lang="fr-FR" dirty="0"/>
               </a:p>
@@ -6368,7 +6409,7 @@
           </p:nvSpPr>
           <p:spPr>
             <a:xfrm>
-              <a:off x="6860321" y="1933317"/>
+              <a:off x="6867191" y="2195107"/>
               <a:ext cx="556563" cy="276999"/>
             </a:xfrm>
             <a:prstGeom prst="rect">
@@ -6386,7 +6427,7 @@
                   <a:latin typeface="Courier New" panose="02070309020205020404" pitchFamily="49" charset="0"/>
                   <a:cs typeface="Courier New" panose="02070309020205020404" pitchFamily="49" charset="0"/>
                 </a:rPr>
-                <a:t>0..*</a:t>
+                <a:t>0..1</a:t>
               </a:r>
               <a:endParaRPr lang="fr-FR" sz="1200" dirty="0"/>
             </a:p>
@@ -7635,7 +7676,7 @@
                   <a:latin typeface="Courier New" panose="02070309020205020404" pitchFamily="49" charset="0"/>
                   <a:cs typeface="Courier New" panose="02070309020205020404" pitchFamily="49" charset="0"/>
                 </a:rPr>
-                <a:t>0..1</a:t>
+                <a:t>0..*</a:t>
               </a:r>
               <a:endParaRPr lang="fr-FR" sz="1200" dirty="0"/>
             </a:p>

</xml_diff>

<commit_message>
update pptx uml diagram; set id optional
</commit_message>
<xml_diff>
--- a/images/uml-overview.pptx
+++ b/images/uml-overview.pptx
@@ -257,7 +257,7 @@
           <a:p>
             <a:fld id="{65CEBD62-2936-4F77-8E23-0F21680CD184}" type="datetimeFigureOut">
               <a:rPr lang="fr-FR" smtClean="0"/>
-              <a:t>17/05/2019</a:t>
+              <a:t>18/10/2019</a:t>
             </a:fld>
             <a:endParaRPr lang="fr-FR"/>
           </a:p>
@@ -299,7 +299,7 @@
           <a:p>
             <a:fld id="{50B9B4BF-1266-4754-94A3-149AB5A4D7EE}" type="slidenum">
               <a:rPr lang="fr-FR" smtClean="0"/>
-              <a:t>‹N°›</a:t>
+              <a:t>‹#›</a:t>
             </a:fld>
             <a:endParaRPr lang="fr-FR"/>
           </a:p>
@@ -427,7 +427,7 @@
           <a:p>
             <a:fld id="{65CEBD62-2936-4F77-8E23-0F21680CD184}" type="datetimeFigureOut">
               <a:rPr lang="fr-FR" smtClean="0"/>
-              <a:t>17/05/2019</a:t>
+              <a:t>18/10/2019</a:t>
             </a:fld>
             <a:endParaRPr lang="fr-FR"/>
           </a:p>
@@ -469,7 +469,7 @@
           <a:p>
             <a:fld id="{50B9B4BF-1266-4754-94A3-149AB5A4D7EE}" type="slidenum">
               <a:rPr lang="fr-FR" smtClean="0"/>
-              <a:t>‹N°›</a:t>
+              <a:t>‹#›</a:t>
             </a:fld>
             <a:endParaRPr lang="fr-FR"/>
           </a:p>
@@ -607,7 +607,7 @@
           <a:p>
             <a:fld id="{65CEBD62-2936-4F77-8E23-0F21680CD184}" type="datetimeFigureOut">
               <a:rPr lang="fr-FR" smtClean="0"/>
-              <a:t>17/05/2019</a:t>
+              <a:t>18/10/2019</a:t>
             </a:fld>
             <a:endParaRPr lang="fr-FR"/>
           </a:p>
@@ -649,7 +649,7 @@
           <a:p>
             <a:fld id="{50B9B4BF-1266-4754-94A3-149AB5A4D7EE}" type="slidenum">
               <a:rPr lang="fr-FR" smtClean="0"/>
-              <a:t>‹N°›</a:t>
+              <a:t>‹#›</a:t>
             </a:fld>
             <a:endParaRPr lang="fr-FR"/>
           </a:p>
@@ -777,7 +777,7 @@
           <a:p>
             <a:fld id="{65CEBD62-2936-4F77-8E23-0F21680CD184}" type="datetimeFigureOut">
               <a:rPr lang="fr-FR" smtClean="0"/>
-              <a:t>17/05/2019</a:t>
+              <a:t>18/10/2019</a:t>
             </a:fld>
             <a:endParaRPr lang="fr-FR"/>
           </a:p>
@@ -819,7 +819,7 @@
           <a:p>
             <a:fld id="{50B9B4BF-1266-4754-94A3-149AB5A4D7EE}" type="slidenum">
               <a:rPr lang="fr-FR" smtClean="0"/>
-              <a:t>‹N°›</a:t>
+              <a:t>‹#›</a:t>
             </a:fld>
             <a:endParaRPr lang="fr-FR"/>
           </a:p>
@@ -1021,7 +1021,7 @@
           <a:p>
             <a:fld id="{65CEBD62-2936-4F77-8E23-0F21680CD184}" type="datetimeFigureOut">
               <a:rPr lang="fr-FR" smtClean="0"/>
-              <a:t>17/05/2019</a:t>
+              <a:t>18/10/2019</a:t>
             </a:fld>
             <a:endParaRPr lang="fr-FR"/>
           </a:p>
@@ -1063,7 +1063,7 @@
           <a:p>
             <a:fld id="{50B9B4BF-1266-4754-94A3-149AB5A4D7EE}" type="slidenum">
               <a:rPr lang="fr-FR" smtClean="0"/>
-              <a:t>‹N°›</a:t>
+              <a:t>‹#›</a:t>
             </a:fld>
             <a:endParaRPr lang="fr-FR"/>
           </a:p>
@@ -1253,7 +1253,7 @@
           <a:p>
             <a:fld id="{65CEBD62-2936-4F77-8E23-0F21680CD184}" type="datetimeFigureOut">
               <a:rPr lang="fr-FR" smtClean="0"/>
-              <a:t>17/05/2019</a:t>
+              <a:t>18/10/2019</a:t>
             </a:fld>
             <a:endParaRPr lang="fr-FR"/>
           </a:p>
@@ -1295,7 +1295,7 @@
           <a:p>
             <a:fld id="{50B9B4BF-1266-4754-94A3-149AB5A4D7EE}" type="slidenum">
               <a:rPr lang="fr-FR" smtClean="0"/>
-              <a:t>‹N°›</a:t>
+              <a:t>‹#›</a:t>
             </a:fld>
             <a:endParaRPr lang="fr-FR"/>
           </a:p>
@@ -1620,7 +1620,7 @@
           <a:p>
             <a:fld id="{65CEBD62-2936-4F77-8E23-0F21680CD184}" type="datetimeFigureOut">
               <a:rPr lang="fr-FR" smtClean="0"/>
-              <a:t>17/05/2019</a:t>
+              <a:t>18/10/2019</a:t>
             </a:fld>
             <a:endParaRPr lang="fr-FR"/>
           </a:p>
@@ -1662,7 +1662,7 @@
           <a:p>
             <a:fld id="{50B9B4BF-1266-4754-94A3-149AB5A4D7EE}" type="slidenum">
               <a:rPr lang="fr-FR" smtClean="0"/>
-              <a:t>‹N°›</a:t>
+              <a:t>‹#›</a:t>
             </a:fld>
             <a:endParaRPr lang="fr-FR"/>
           </a:p>
@@ -1738,7 +1738,7 @@
           <a:p>
             <a:fld id="{65CEBD62-2936-4F77-8E23-0F21680CD184}" type="datetimeFigureOut">
               <a:rPr lang="fr-FR" smtClean="0"/>
-              <a:t>17/05/2019</a:t>
+              <a:t>18/10/2019</a:t>
             </a:fld>
             <a:endParaRPr lang="fr-FR"/>
           </a:p>
@@ -1780,7 +1780,7 @@
           <a:p>
             <a:fld id="{50B9B4BF-1266-4754-94A3-149AB5A4D7EE}" type="slidenum">
               <a:rPr lang="fr-FR" smtClean="0"/>
-              <a:t>‹N°›</a:t>
+              <a:t>‹#›</a:t>
             </a:fld>
             <a:endParaRPr lang="fr-FR"/>
           </a:p>
@@ -1833,7 +1833,7 @@
           <a:p>
             <a:fld id="{65CEBD62-2936-4F77-8E23-0F21680CD184}" type="datetimeFigureOut">
               <a:rPr lang="fr-FR" smtClean="0"/>
-              <a:t>17/05/2019</a:t>
+              <a:t>18/10/2019</a:t>
             </a:fld>
             <a:endParaRPr lang="fr-FR"/>
           </a:p>
@@ -1875,7 +1875,7 @@
           <a:p>
             <a:fld id="{50B9B4BF-1266-4754-94A3-149AB5A4D7EE}" type="slidenum">
               <a:rPr lang="fr-FR" smtClean="0"/>
-              <a:t>‹N°›</a:t>
+              <a:t>‹#›</a:t>
             </a:fld>
             <a:endParaRPr lang="fr-FR"/>
           </a:p>
@@ -2110,7 +2110,7 @@
           <a:p>
             <a:fld id="{65CEBD62-2936-4F77-8E23-0F21680CD184}" type="datetimeFigureOut">
               <a:rPr lang="fr-FR" smtClean="0"/>
-              <a:t>17/05/2019</a:t>
+              <a:t>18/10/2019</a:t>
             </a:fld>
             <a:endParaRPr lang="fr-FR"/>
           </a:p>
@@ -2152,7 +2152,7 @@
           <a:p>
             <a:fld id="{50B9B4BF-1266-4754-94A3-149AB5A4D7EE}" type="slidenum">
               <a:rPr lang="fr-FR" smtClean="0"/>
-              <a:t>‹N°›</a:t>
+              <a:t>‹#›</a:t>
             </a:fld>
             <a:endParaRPr lang="fr-FR"/>
           </a:p>
@@ -2367,7 +2367,7 @@
           <a:p>
             <a:fld id="{65CEBD62-2936-4F77-8E23-0F21680CD184}" type="datetimeFigureOut">
               <a:rPr lang="fr-FR" smtClean="0"/>
-              <a:t>17/05/2019</a:t>
+              <a:t>18/10/2019</a:t>
             </a:fld>
             <a:endParaRPr lang="fr-FR"/>
           </a:p>
@@ -2409,7 +2409,7 @@
           <a:p>
             <a:fld id="{50B9B4BF-1266-4754-94A3-149AB5A4D7EE}" type="slidenum">
               <a:rPr lang="fr-FR" smtClean="0"/>
-              <a:t>‹N°›</a:t>
+              <a:t>‹#›</a:t>
             </a:fld>
             <a:endParaRPr lang="fr-FR"/>
           </a:p>
@@ -2580,7 +2580,7 @@
           <a:p>
             <a:fld id="{65CEBD62-2936-4F77-8E23-0F21680CD184}" type="datetimeFigureOut">
               <a:rPr lang="fr-FR" smtClean="0"/>
-              <a:t>17/05/2019</a:t>
+              <a:t>18/10/2019</a:t>
             </a:fld>
             <a:endParaRPr lang="fr-FR"/>
           </a:p>
@@ -2658,7 +2658,7 @@
           <a:p>
             <a:fld id="{50B9B4BF-1266-4754-94A3-149AB5A4D7EE}" type="slidenum">
               <a:rPr lang="fr-FR" smtClean="0"/>
-              <a:t>‹N°›</a:t>
+              <a:t>‹#›</a:t>
             </a:fld>
             <a:endParaRPr lang="fr-FR"/>
           </a:p>
@@ -3000,7 +3000,7 @@
           <p:nvPr>
             <p:extLst>
               <p:ext uri="{D42A27DB-BD31-4B8C-83A1-F6EECF244321}">
-                <p14:modId xmlns:p14="http://schemas.microsoft.com/office/powerpoint/2010/main" val="4104759069"/>
+                <p14:modId xmlns:p14="http://schemas.microsoft.com/office/powerpoint/2010/main" val="457976366"/>
               </p:ext>
             </p:extLst>
           </p:nvPr>
@@ -3271,6 +3271,26 @@
                           <a:cs typeface="Courier New" panose="02070309020205020404" pitchFamily="49" charset="0"/>
                         </a:rPr>
                         <a:t>anyURI</a:t>
+                      </a:r>
+                      <a:r>
+                        <a:rPr lang="de-DE" sz="1200" dirty="0">
+                          <a:solidFill>
+                            <a:srgbClr val="C83500"/>
+                          </a:solidFill>
+                          <a:latin typeface="Courier New" panose="02070309020205020404" pitchFamily="49" charset="0"/>
+                          <a:cs typeface="Courier New" panose="02070309020205020404" pitchFamily="49" charset="0"/>
+                        </a:rPr>
+                        <a:t> </a:t>
+                      </a:r>
+                      <a:r>
+                        <a:rPr lang="de-DE" sz="1200" dirty="0">
+                          <a:solidFill>
+                            <a:schemeClr val="tx1"/>
+                          </a:solidFill>
+                          <a:latin typeface="Courier New" panose="02070309020205020404" pitchFamily="49" charset="0"/>
+                          <a:cs typeface="Courier New" panose="02070309020205020404" pitchFamily="49" charset="0"/>
+                        </a:rPr>
+                        <a:t>[0..1]</a:t>
                       </a:r>
                       <a:endParaRPr lang="fr-FR" sz="1200" dirty="0">
                         <a:solidFill>
@@ -7527,8 +7547,8 @@
         </p:nvGrpSpPr>
         <p:grpSpPr>
           <a:xfrm>
-            <a:off x="9477891" y="4234618"/>
-            <a:ext cx="3511090" cy="4306096"/>
+            <a:off x="9540231" y="4234618"/>
+            <a:ext cx="3238467" cy="4373692"/>
             <a:chOff x="9477891" y="4234618"/>
             <a:chExt cx="3511090" cy="4306096"/>
           </a:xfrm>

</xml_diff>

<commit_message>
change security term 0..* to 1..* in pptx
</commit_message>
<xml_diff>
--- a/images/uml-overview.pptx
+++ b/images/uml-overview.pptx
@@ -257,7 +257,7 @@
           <a:p>
             <a:fld id="{65CEBD62-2936-4F77-8E23-0F21680CD184}" type="datetimeFigureOut">
               <a:rPr lang="fr-FR" smtClean="0"/>
-              <a:t>18/10/2019</a:t>
+              <a:t>21/10/2019</a:t>
             </a:fld>
             <a:endParaRPr lang="fr-FR"/>
           </a:p>
@@ -427,7 +427,7 @@
           <a:p>
             <a:fld id="{65CEBD62-2936-4F77-8E23-0F21680CD184}" type="datetimeFigureOut">
               <a:rPr lang="fr-FR" smtClean="0"/>
-              <a:t>18/10/2019</a:t>
+              <a:t>21/10/2019</a:t>
             </a:fld>
             <a:endParaRPr lang="fr-FR"/>
           </a:p>
@@ -607,7 +607,7 @@
           <a:p>
             <a:fld id="{65CEBD62-2936-4F77-8E23-0F21680CD184}" type="datetimeFigureOut">
               <a:rPr lang="fr-FR" smtClean="0"/>
-              <a:t>18/10/2019</a:t>
+              <a:t>21/10/2019</a:t>
             </a:fld>
             <a:endParaRPr lang="fr-FR"/>
           </a:p>
@@ -777,7 +777,7 @@
           <a:p>
             <a:fld id="{65CEBD62-2936-4F77-8E23-0F21680CD184}" type="datetimeFigureOut">
               <a:rPr lang="fr-FR" smtClean="0"/>
-              <a:t>18/10/2019</a:t>
+              <a:t>21/10/2019</a:t>
             </a:fld>
             <a:endParaRPr lang="fr-FR"/>
           </a:p>
@@ -1021,7 +1021,7 @@
           <a:p>
             <a:fld id="{65CEBD62-2936-4F77-8E23-0F21680CD184}" type="datetimeFigureOut">
               <a:rPr lang="fr-FR" smtClean="0"/>
-              <a:t>18/10/2019</a:t>
+              <a:t>21/10/2019</a:t>
             </a:fld>
             <a:endParaRPr lang="fr-FR"/>
           </a:p>
@@ -1253,7 +1253,7 @@
           <a:p>
             <a:fld id="{65CEBD62-2936-4F77-8E23-0F21680CD184}" type="datetimeFigureOut">
               <a:rPr lang="fr-FR" smtClean="0"/>
-              <a:t>18/10/2019</a:t>
+              <a:t>21/10/2019</a:t>
             </a:fld>
             <a:endParaRPr lang="fr-FR"/>
           </a:p>
@@ -1620,7 +1620,7 @@
           <a:p>
             <a:fld id="{65CEBD62-2936-4F77-8E23-0F21680CD184}" type="datetimeFigureOut">
               <a:rPr lang="fr-FR" smtClean="0"/>
-              <a:t>18/10/2019</a:t>
+              <a:t>21/10/2019</a:t>
             </a:fld>
             <a:endParaRPr lang="fr-FR"/>
           </a:p>
@@ -1738,7 +1738,7 @@
           <a:p>
             <a:fld id="{65CEBD62-2936-4F77-8E23-0F21680CD184}" type="datetimeFigureOut">
               <a:rPr lang="fr-FR" smtClean="0"/>
-              <a:t>18/10/2019</a:t>
+              <a:t>21/10/2019</a:t>
             </a:fld>
             <a:endParaRPr lang="fr-FR"/>
           </a:p>
@@ -1833,7 +1833,7 @@
           <a:p>
             <a:fld id="{65CEBD62-2936-4F77-8E23-0F21680CD184}" type="datetimeFigureOut">
               <a:rPr lang="fr-FR" smtClean="0"/>
-              <a:t>18/10/2019</a:t>
+              <a:t>21/10/2019</a:t>
             </a:fld>
             <a:endParaRPr lang="fr-FR"/>
           </a:p>
@@ -2110,7 +2110,7 @@
           <a:p>
             <a:fld id="{65CEBD62-2936-4F77-8E23-0F21680CD184}" type="datetimeFigureOut">
               <a:rPr lang="fr-FR" smtClean="0"/>
-              <a:t>18/10/2019</a:t>
+              <a:t>21/10/2019</a:t>
             </a:fld>
             <a:endParaRPr lang="fr-FR"/>
           </a:p>
@@ -2367,7 +2367,7 @@
           <a:p>
             <a:fld id="{65CEBD62-2936-4F77-8E23-0F21680CD184}" type="datetimeFigureOut">
               <a:rPr lang="fr-FR" smtClean="0"/>
-              <a:t>18/10/2019</a:t>
+              <a:t>21/10/2019</a:t>
             </a:fld>
             <a:endParaRPr lang="fr-FR"/>
           </a:p>
@@ -2580,7 +2580,7 @@
           <a:p>
             <a:fld id="{65CEBD62-2936-4F77-8E23-0F21680CD184}" type="datetimeFigureOut">
               <a:rPr lang="fr-FR" smtClean="0"/>
-              <a:t>18/10/2019</a:t>
+              <a:t>21/10/2019</a:t>
             </a:fld>
             <a:endParaRPr lang="fr-FR"/>
           </a:p>
@@ -3000,7 +3000,7 @@
           <p:nvPr>
             <p:extLst>
               <p:ext uri="{D42A27DB-BD31-4B8C-83A1-F6EECF244321}">
-                <p14:modId xmlns:p14="http://schemas.microsoft.com/office/powerpoint/2010/main" val="457976366"/>
+                <p14:modId xmlns:p14="http://schemas.microsoft.com/office/powerpoint/2010/main" val="3509396285"/>
               </p:ext>
             </p:extLst>
           </p:nvPr>
@@ -3789,7 +3789,7 @@
                         <a:t>string</a:t>
                       </a:r>
                       <a:r>
-                        <a:rPr lang="de-DE" sz="1200" dirty="0">
+                        <a:rPr lang="de-DE" sz="1200">
                           <a:solidFill>
                             <a:srgbClr val="C83500"/>
                           </a:solidFill>
@@ -3799,14 +3799,14 @@
                         <a:t> </a:t>
                       </a:r>
                       <a:r>
-                        <a:rPr lang="de-DE" sz="1200" dirty="0">
+                        <a:rPr lang="de-DE" sz="1200">
                           <a:solidFill>
                             <a:schemeClr val="tx1"/>
                           </a:solidFill>
                           <a:latin typeface="Courier New" panose="02070309020205020404" pitchFamily="49" charset="0"/>
                           <a:cs typeface="Courier New" panose="02070309020205020404" pitchFamily="49" charset="0"/>
                         </a:rPr>
-                        <a:t>[0..*]</a:t>
+                        <a:t>[1..*]</a:t>
                       </a:r>
                       <a:endParaRPr lang="fr-FR" sz="1200" dirty="0">
                         <a:solidFill>

</xml_diff>